<commit_message>
Updated the first diploma seminar presentation.
</commit_message>
<xml_diff>
--- a/DipSem17-03.pptx
+++ b/DipSem17-03.pptx
@@ -5716,7 +5716,7 @@
               <a:pPr>
                 <a:defRPr/>
               </a:pPr>
-              <a:t>16.03.2023</a:t>
+              <a:t>17.03.2023</a:t>
             </a:fld>
             <a:endParaRPr lang="pl-PL"/>
           </a:p>
@@ -5934,7 +5934,7 @@
               <a:pPr>
                 <a:defRPr/>
               </a:pPr>
-              <a:t>16.03.2023</a:t>
+              <a:t>17.03.2023</a:t>
             </a:fld>
             <a:endParaRPr lang="pl-PL"/>
           </a:p>
@@ -11998,7 +11998,7 @@
         <p:spPr>
           <a:xfrm>
             <a:off x="1400432" y="4365103"/>
-            <a:ext cx="7617618" cy="383657"/>
+            <a:ext cx="7617618" cy="923330"/>
           </a:xfrm>
           <a:prstGeom prst="rect">
             <a:avLst/>
@@ -12015,6 +12015,21 @@
             <a:r>
               <a:rPr lang="pl-PL" dirty="0"/>
               <a:t>Maciej Sroczek 242450</a:t>
+            </a:r>
+          </a:p>
+          <a:p>
+            <a:pPr algn="ctr"/>
+            <a:endParaRPr lang="pl-PL" dirty="0"/>
+          </a:p>
+          <a:p>
+            <a:pPr algn="ctr"/>
+            <a:r>
+              <a:rPr lang="pl-PL" dirty="0" err="1"/>
+              <a:t>Supervisor</a:t>
+            </a:r>
+            <a:r>
+              <a:rPr lang="pl-PL" dirty="0"/>
+              <a:t>: dr inż. Dariusz Konieczny</a:t>
             </a:r>
             <a:endParaRPr lang="en-US" dirty="0"/>
           </a:p>
@@ -12560,7 +12575,15 @@
             </a:r>
             <a:r>
               <a:rPr lang="pl-PL" dirty="0" err="1"/>
-              <a:t>different</a:t>
+              <a:t>possibly</a:t>
+            </a:r>
+            <a:r>
+              <a:rPr lang="pl-PL" dirty="0"/>
+              <a:t> </a:t>
+            </a:r>
+            <a:r>
+              <a:rPr lang="pl-PL" dirty="0" err="1"/>
+              <a:t>optimal</a:t>
             </a:r>
             <a:r>
               <a:rPr lang="pl-PL" dirty="0"/>
@@ -12850,7 +12873,7 @@
             <a:pPr algn="just"/>
             <a:r>
               <a:rPr lang="pl-PL" dirty="0" err="1"/>
-              <a:t>Prepare</a:t>
+              <a:t>Implement</a:t>
             </a:r>
             <a:r>
               <a:rPr lang="pl-PL" dirty="0"/>

</xml_diff>